<commit_message>
Cerveau: AI - add caption on functional schema
</commit_message>
<xml_diff>
--- a/Module Cerveau/Artificial Intelligence/AI_functional_schema.pptx
+++ b/Module Cerveau/Artificial Intelligence/AI_functional_schema.pptx
@@ -4967,6 +4967,228 @@
           </a:p>
         </p:txBody>
       </p:sp>
+      <p:grpSp>
+        <p:nvGrpSpPr>
+          <p:cNvPr id="25" name="Grouper 24"/>
+          <p:cNvGrpSpPr/>
+          <p:nvPr/>
+        </p:nvGrpSpPr>
+        <p:grpSpPr>
+          <a:xfrm>
+            <a:off x="9110980" y="5662295"/>
+            <a:ext cx="2334662" cy="1023620"/>
+            <a:chOff x="12214" y="8905"/>
+            <a:chExt cx="4502" cy="1612"/>
+          </a:xfrm>
+        </p:grpSpPr>
+        <p:sp>
+          <p:nvSpPr>
+            <p:cNvPr id="2" name="Rectangle 1"/>
+            <p:cNvSpPr/>
+            <p:nvPr/>
+          </p:nvSpPr>
+          <p:spPr>
+            <a:xfrm>
+              <a:off x="12214" y="8905"/>
+              <a:ext cx="4302" cy="1612"/>
+            </a:xfrm>
+            <a:prstGeom prst="rect">
+              <a:avLst/>
+            </a:prstGeom>
+          </p:spPr>
+          <p:style>
+            <a:lnRef idx="2">
+              <a:schemeClr val="dk1"/>
+            </a:lnRef>
+            <a:fillRef idx="1">
+              <a:schemeClr val="lt1"/>
+            </a:fillRef>
+            <a:effectRef idx="0">
+              <a:schemeClr val="dk1"/>
+            </a:effectRef>
+            <a:fontRef idx="minor">
+              <a:schemeClr val="dk1"/>
+            </a:fontRef>
+          </p:style>
+          <p:txBody>
+            <a:bodyPr rtlCol="0" anchor="t" anchorCtr="0"/>
+            <a:p>
+              <a:pPr lvl="0" algn="l"/>
+              <a:r>
+                <a:rPr lang="x-none" altLang="fr-FR" sz="1200"/>
+                <a:t>Légende :</a:t>
+              </a:r>
+              <a:r>
+                <a:rPr lang="x-none" altLang="fr-FR"/>
+                <a:t> </a:t>
+              </a:r>
+              <a:endParaRPr lang="x-none" altLang="fr-FR"/>
+            </a:p>
+          </p:txBody>
+        </p:sp>
+        <p:grpSp>
+          <p:nvGrpSpPr>
+            <p:cNvPr id="8" name="Grouper 7"/>
+            <p:cNvGrpSpPr/>
+            <p:nvPr/>
+          </p:nvGrpSpPr>
+          <p:grpSpPr>
+            <a:xfrm>
+              <a:off x="12454" y="9425"/>
+              <a:ext cx="4251" cy="434"/>
+              <a:chOff x="12454" y="9425"/>
+              <a:chExt cx="4251" cy="434"/>
+            </a:xfrm>
+          </p:grpSpPr>
+          <p:sp>
+            <p:nvSpPr>
+              <p:cNvPr id="5" name="Ellipse 4"/>
+              <p:cNvSpPr/>
+              <p:nvPr/>
+            </p:nvSpPr>
+            <p:spPr>
+              <a:xfrm>
+                <a:off x="12454" y="9438"/>
+                <a:ext cx="825" cy="406"/>
+              </a:xfrm>
+              <a:prstGeom prst="ellipse">
+                <a:avLst/>
+              </a:prstGeom>
+            </p:spPr>
+            <p:style>
+              <a:lnRef idx="1">
+                <a:schemeClr val="accent1"/>
+              </a:lnRef>
+              <a:fillRef idx="2">
+                <a:schemeClr val="accent1"/>
+              </a:fillRef>
+              <a:effectRef idx="1">
+                <a:schemeClr val="accent1"/>
+              </a:effectRef>
+              <a:fontRef idx="minor">
+                <a:schemeClr val="dk1"/>
+              </a:fontRef>
+            </p:style>
+            <p:txBody>
+              <a:bodyPr rtlCol="0" anchor="ctr"/>
+              <a:p>
+                <a:pPr algn="ctr"/>
+                <a:endParaRPr lang="fr-FR" altLang="en-US"/>
+              </a:p>
+            </p:txBody>
+          </p:sp>
+          <p:sp>
+            <p:nvSpPr>
+              <p:cNvPr id="6" name="TextBox 5"/>
+              <p:cNvSpPr txBox="1"/>
+              <p:nvPr/>
+            </p:nvSpPr>
+            <p:spPr>
+              <a:xfrm>
+                <a:off x="13558" y="9425"/>
+                <a:ext cx="3147" cy="434"/>
+              </a:xfrm>
+              <a:prstGeom prst="rect">
+                <a:avLst/>
+              </a:prstGeom>
+              <a:noFill/>
+            </p:spPr>
+            <p:txBody>
+              <a:bodyPr wrap="square" rtlCol="0">
+                <a:spAutoFit/>
+              </a:bodyPr>
+              <a:p>
+                <a:r>
+                  <a:rPr lang="x-none" altLang="fr-FR" sz="1200"/>
+                  <a:t>Condition</a:t>
+                </a:r>
+                <a:endParaRPr lang="x-none" altLang="fr-FR" sz="1200"/>
+              </a:p>
+            </p:txBody>
+          </p:sp>
+        </p:grpSp>
+        <p:grpSp>
+          <p:nvGrpSpPr>
+            <p:cNvPr id="16" name="Grouper 15"/>
+            <p:cNvGrpSpPr/>
+            <p:nvPr/>
+          </p:nvGrpSpPr>
+          <p:grpSpPr>
+            <a:xfrm>
+              <a:off x="12454" y="9918"/>
+              <a:ext cx="4262" cy="434"/>
+              <a:chOff x="12454" y="9918"/>
+              <a:chExt cx="4262" cy="434"/>
+            </a:xfrm>
+          </p:grpSpPr>
+          <p:sp>
+            <p:nvSpPr>
+              <p:cNvPr id="4" name="Rectangle à coins arrondi 3"/>
+              <p:cNvSpPr/>
+              <p:nvPr/>
+            </p:nvSpPr>
+            <p:spPr>
+              <a:xfrm>
+                <a:off x="12454" y="9960"/>
+                <a:ext cx="814" cy="383"/>
+              </a:xfrm>
+              <a:prstGeom prst="roundRect">
+                <a:avLst/>
+              </a:prstGeom>
+            </p:spPr>
+            <p:style>
+              <a:lnRef idx="1">
+                <a:schemeClr val="accent1"/>
+              </a:lnRef>
+              <a:fillRef idx="2">
+                <a:schemeClr val="accent1"/>
+              </a:fillRef>
+              <a:effectRef idx="1">
+                <a:schemeClr val="accent1"/>
+              </a:effectRef>
+              <a:fontRef idx="minor">
+                <a:schemeClr val="dk1"/>
+              </a:fontRef>
+            </p:style>
+            <p:txBody>
+              <a:bodyPr rtlCol="0" anchor="ctr"/>
+              <a:p>
+                <a:pPr algn="ctr"/>
+                <a:endParaRPr lang="fr-FR" altLang="en-US"/>
+              </a:p>
+            </p:txBody>
+          </p:sp>
+          <p:sp>
+            <p:nvSpPr>
+              <p:cNvPr id="7" name="TextBox 6"/>
+              <p:cNvSpPr txBox="1"/>
+              <p:nvPr/>
+            </p:nvSpPr>
+            <p:spPr>
+              <a:xfrm>
+                <a:off x="13569" y="9918"/>
+                <a:ext cx="3147" cy="434"/>
+              </a:xfrm>
+              <a:prstGeom prst="rect">
+                <a:avLst/>
+              </a:prstGeom>
+              <a:noFill/>
+            </p:spPr>
+            <p:txBody>
+              <a:bodyPr wrap="square" rtlCol="0">
+                <a:spAutoFit/>
+              </a:bodyPr>
+              <a:p>
+                <a:r>
+                  <a:rPr lang="x-none" altLang="fr-FR" sz="1200"/>
+                  <a:t>Action</a:t>
+                </a:r>
+                <a:endParaRPr lang="x-none" altLang="fr-FR" sz="1200"/>
+              </a:p>
+            </p:txBody>
+          </p:sp>
+        </p:grpSp>
+      </p:grpSp>
     </p:spTree>
   </p:cSld>
   <p:clrMapOvr>

</xml_diff>

<commit_message>
Cerveau: AI - ajout bouton d'arrêt d'urgence au schéma fonctionnel
</commit_message>
<xml_diff>
--- a/Module Cerveau/Artificial Intelligence/AI_functional_schema.pptx
+++ b/Module Cerveau/Artificial Intelligence/AI_functional_schema.pptx
@@ -2924,7 +2924,7 @@
         </p:nvGrpSpPr>
         <p:grpSpPr>
           <a:xfrm>
-            <a:off x="1141730" y="5488305"/>
+            <a:off x="2317750" y="5819140"/>
             <a:ext cx="1752600" cy="476250"/>
             <a:chOff x="7086" y="887"/>
             <a:chExt cx="4379" cy="1180"/>
@@ -3020,8 +3020,8 @@
         </p:nvGrpSpPr>
         <p:grpSpPr>
           <a:xfrm>
-            <a:off x="10015855" y="2054225"/>
-            <a:ext cx="2025650" cy="1759585"/>
+            <a:off x="10645775" y="2055495"/>
+            <a:ext cx="1397635" cy="2268220"/>
             <a:chOff x="7086" y="887"/>
             <a:chExt cx="4379" cy="1180"/>
           </a:xfrm>
@@ -3086,7 +3086,7 @@
           <p:spPr>
             <a:xfrm>
               <a:off x="7227" y="974"/>
-              <a:ext cx="4165" cy="982"/>
+              <a:ext cx="4165" cy="905"/>
             </a:xfrm>
             <a:prstGeom prst="rect">
               <a:avLst/>
@@ -3205,7 +3205,7 @@
         </p:nvGrpSpPr>
         <p:grpSpPr>
           <a:xfrm>
-            <a:off x="6522017" y="1963420"/>
+            <a:off x="7537382" y="2108835"/>
             <a:ext cx="1443355" cy="812800"/>
             <a:chOff x="7213" y="3012"/>
             <a:chExt cx="3848" cy="1280"/>
@@ -3287,7 +3287,7 @@
         </p:nvGrpSpPr>
         <p:grpSpPr>
           <a:xfrm>
-            <a:off x="452120" y="1723390"/>
+            <a:off x="2298065" y="1819910"/>
             <a:ext cx="1933575" cy="812800"/>
             <a:chOff x="7137" y="3057"/>
             <a:chExt cx="3848" cy="1280"/>
@@ -3369,7 +3369,7 @@
         </p:nvGrpSpPr>
         <p:grpSpPr>
           <a:xfrm>
-            <a:off x="146685" y="2919095"/>
+            <a:off x="1597025" y="2999740"/>
             <a:ext cx="1443355" cy="1004570"/>
             <a:chOff x="7137" y="3057"/>
             <a:chExt cx="3848" cy="1280"/>
@@ -3451,7 +3451,7 @@
         </p:nvGrpSpPr>
         <p:grpSpPr>
           <a:xfrm>
-            <a:off x="250190" y="4217670"/>
+            <a:off x="1450975" y="4258310"/>
             <a:ext cx="1677670" cy="788670"/>
             <a:chOff x="7086" y="887"/>
             <a:chExt cx="4379" cy="1180"/>
@@ -3547,8 +3547,8 @@
         </p:nvGrpSpPr>
         <p:grpSpPr>
           <a:xfrm>
-            <a:off x="8157845" y="4185285"/>
-            <a:ext cx="1828800" cy="1156970"/>
+            <a:off x="9085580" y="4154170"/>
+            <a:ext cx="1475105" cy="1317625"/>
             <a:chOff x="7086" y="887"/>
             <a:chExt cx="4379" cy="1180"/>
           </a:xfrm>
@@ -3613,7 +3613,7 @@
           <p:spPr>
             <a:xfrm>
               <a:off x="7227" y="974"/>
-              <a:ext cx="4165" cy="935"/>
+              <a:ext cx="4165" cy="1066"/>
             </a:xfrm>
             <a:prstGeom prst="rect">
               <a:avLst/>
@@ -3643,7 +3643,7 @@
         </p:nvGrpSpPr>
         <p:grpSpPr>
           <a:xfrm>
-            <a:off x="8187055" y="2053590"/>
+            <a:off x="9033510" y="2109470"/>
             <a:ext cx="1527810" cy="812800"/>
             <a:chOff x="7137" y="3057"/>
             <a:chExt cx="3848" cy="1280"/>
@@ -3725,8 +3725,8 @@
         </p:nvGrpSpPr>
         <p:grpSpPr>
           <a:xfrm>
-            <a:off x="6497320" y="4195445"/>
-            <a:ext cx="1496695" cy="749300"/>
+            <a:off x="7522210" y="4501515"/>
+            <a:ext cx="1480185" cy="749300"/>
             <a:chOff x="7086" y="887"/>
             <a:chExt cx="4379" cy="1180"/>
           </a:xfrm>
@@ -3817,15 +3817,15 @@
         <p:nvCxnSpPr>
           <p:cNvPr id="46" name="Straight Arrow Connector 45"/>
           <p:cNvCxnSpPr>
-            <a:stCxn id="17" idx="1"/>
+            <a:stCxn id="15" idx="3"/>
             <a:endCxn id="23" idx="0"/>
           </p:cNvCxnSpPr>
           <p:nvPr/>
         </p:nvCxnSpPr>
         <p:spPr>
           <a:xfrm flipH="1">
-            <a:off x="1419225" y="864235"/>
-            <a:ext cx="3188335" cy="859155"/>
+            <a:off x="3265170" y="1162050"/>
+            <a:ext cx="1644015" cy="657860"/>
           </a:xfrm>
           <a:prstGeom prst="straightConnector1">
             <a:avLst/>
@@ -3853,15 +3853,15 @@
         <p:nvCxnSpPr>
           <p:cNvPr id="47" name="Straight Arrow Connector 46"/>
           <p:cNvCxnSpPr>
-            <a:stCxn id="23" idx="4"/>
+            <a:stCxn id="23" idx="3"/>
             <a:endCxn id="29" idx="0"/>
           </p:cNvCxnSpPr>
           <p:nvPr/>
         </p:nvCxnSpPr>
         <p:spPr>
           <a:xfrm flipH="1">
-            <a:off x="868680" y="2536190"/>
-            <a:ext cx="550545" cy="382905"/>
+            <a:off x="2319020" y="2513965"/>
+            <a:ext cx="262255" cy="485775"/>
           </a:xfrm>
           <a:prstGeom prst="straightConnector1">
             <a:avLst/>
@@ -3895,9 +3895,9 @@
           <p:nvPr/>
         </p:nvCxnSpPr>
         <p:spPr>
-          <a:xfrm>
-            <a:off x="868680" y="3923665"/>
-            <a:ext cx="207645" cy="354330"/>
+          <a:xfrm flipH="1">
+            <a:off x="2277110" y="4004310"/>
+            <a:ext cx="41910" cy="314325"/>
           </a:xfrm>
           <a:prstGeom prst="straightConnector1">
             <a:avLst/>
@@ -3932,8 +3932,8 @@
         </p:nvCxnSpPr>
         <p:spPr>
           <a:xfrm>
-            <a:off x="1089025" y="5006340"/>
-            <a:ext cx="942975" cy="516890"/>
+            <a:off x="2289810" y="5046980"/>
+            <a:ext cx="918210" cy="807085"/>
           </a:xfrm>
           <a:prstGeom prst="straightConnector1">
             <a:avLst/>
@@ -3961,15 +3961,15 @@
         <p:nvCxnSpPr>
           <p:cNvPr id="50" name="Straight Arrow Connector 49"/>
           <p:cNvCxnSpPr>
-            <a:stCxn id="23" idx="5"/>
+            <a:stCxn id="23" idx="4"/>
             <a:endCxn id="11" idx="0"/>
           </p:cNvCxnSpPr>
           <p:nvPr/>
         </p:nvCxnSpPr>
         <p:spPr>
           <a:xfrm flipH="1">
-            <a:off x="2032000" y="2417445"/>
-            <a:ext cx="70485" cy="3105785"/>
+            <a:off x="3208020" y="2632710"/>
+            <a:ext cx="57150" cy="3221355"/>
           </a:xfrm>
           <a:prstGeom prst="straightConnector1">
             <a:avLst/>
@@ -4005,7 +4005,7 @@
         <p:spPr>
           <a:xfrm>
             <a:off x="6636385" y="1162050"/>
-            <a:ext cx="607695" cy="801370"/>
+            <a:ext cx="1623060" cy="946785"/>
           </a:xfrm>
           <a:prstGeom prst="straightConnector1">
             <a:avLst/>
@@ -4040,8 +4040,8 @@
         </p:nvCxnSpPr>
         <p:spPr>
           <a:xfrm>
-            <a:off x="7244080" y="2776220"/>
-            <a:ext cx="13335" cy="1474470"/>
+            <a:off x="8259445" y="2921635"/>
+            <a:ext cx="14605" cy="1635125"/>
           </a:xfrm>
           <a:prstGeom prst="straightConnector1">
             <a:avLst/>
@@ -4076,8 +4076,8 @@
         </p:nvCxnSpPr>
         <p:spPr>
           <a:xfrm>
-            <a:off x="4587240" y="3778250"/>
-            <a:ext cx="255905" cy="1591310"/>
+            <a:off x="5933440" y="3995420"/>
+            <a:ext cx="175260" cy="1430020"/>
           </a:xfrm>
           <a:prstGeom prst="straightConnector1">
             <a:avLst/>
@@ -4113,7 +4113,7 @@
         <p:spPr>
           <a:xfrm>
             <a:off x="6994525" y="874395"/>
-            <a:ext cx="4034155" cy="1179830"/>
+            <a:ext cx="4350385" cy="1181100"/>
           </a:xfrm>
           <a:prstGeom prst="straightConnector1">
             <a:avLst/>
@@ -4145,7 +4145,7 @@
         </p:nvGrpSpPr>
         <p:grpSpPr>
           <a:xfrm>
-            <a:off x="2253615" y="4368800"/>
+            <a:off x="3607435" y="4513580"/>
             <a:ext cx="1659255" cy="814070"/>
             <a:chOff x="7086" y="887"/>
             <a:chExt cx="4379" cy="1180"/>
@@ -4241,7 +4241,7 @@
         </p:nvGrpSpPr>
         <p:grpSpPr>
           <a:xfrm>
-            <a:off x="2303145" y="2683510"/>
+            <a:off x="3689350" y="2884805"/>
             <a:ext cx="1452880" cy="1227455"/>
             <a:chOff x="7137" y="3057"/>
             <a:chExt cx="3848" cy="1280"/>
@@ -4326,8 +4326,8 @@
         </p:nvCxnSpPr>
         <p:spPr>
           <a:xfrm>
-            <a:off x="3029585" y="3910965"/>
-            <a:ext cx="66675" cy="518160"/>
+            <a:off x="4415790" y="4112260"/>
+            <a:ext cx="34290" cy="461645"/>
           </a:xfrm>
           <a:prstGeom prst="straightConnector1">
             <a:avLst/>
@@ -4355,15 +4355,15 @@
         <p:nvCxnSpPr>
           <p:cNvPr id="55" name="Straight Arrow Connector 54"/>
           <p:cNvCxnSpPr>
-            <a:stCxn id="15" idx="3"/>
+            <a:stCxn id="15" idx="4"/>
             <a:endCxn id="67" idx="0"/>
           </p:cNvCxnSpPr>
           <p:nvPr/>
         </p:nvCxnSpPr>
         <p:spPr>
-          <a:xfrm flipH="1">
-            <a:off x="4568190" y="1162050"/>
-            <a:ext cx="340995" cy="391795"/>
+          <a:xfrm>
+            <a:off x="5772785" y="1280795"/>
+            <a:ext cx="125095" cy="410845"/>
           </a:xfrm>
           <a:prstGeom prst="straightConnector1">
             <a:avLst/>
@@ -4395,7 +4395,7 @@
         </p:nvGrpSpPr>
         <p:grpSpPr>
           <a:xfrm>
-            <a:off x="3846195" y="1553845"/>
+            <a:off x="5175885" y="1691640"/>
             <a:ext cx="1443355" cy="812800"/>
             <a:chOff x="7137" y="3057"/>
             <a:chExt cx="3848" cy="1280"/>
@@ -4480,8 +4480,8 @@
         </p:nvCxnSpPr>
         <p:spPr>
           <a:xfrm flipH="1">
-            <a:off x="3029585" y="1960245"/>
-            <a:ext cx="816610" cy="723265"/>
+            <a:off x="4415790" y="2098040"/>
+            <a:ext cx="760095" cy="786765"/>
           </a:xfrm>
           <a:prstGeom prst="straightConnector1">
             <a:avLst/>
@@ -4516,8 +4516,8 @@
         </p:nvCxnSpPr>
         <p:spPr>
           <a:xfrm>
-            <a:off x="4568190" y="2366645"/>
-            <a:ext cx="19050" cy="523875"/>
+            <a:off x="5897880" y="2504440"/>
+            <a:ext cx="35560" cy="603250"/>
           </a:xfrm>
           <a:prstGeom prst="straightConnector1">
             <a:avLst/>
@@ -4549,7 +4549,7 @@
         </p:nvGrpSpPr>
         <p:grpSpPr>
           <a:xfrm>
-            <a:off x="3928745" y="5369560"/>
+            <a:off x="5194300" y="5425440"/>
             <a:ext cx="1828800" cy="1156970"/>
             <a:chOff x="7086" y="887"/>
             <a:chExt cx="4379" cy="1180"/>
@@ -4645,7 +4645,7 @@
         </p:nvGrpSpPr>
         <p:grpSpPr>
           <a:xfrm>
-            <a:off x="3903345" y="2890520"/>
+            <a:off x="5249545" y="3107690"/>
             <a:ext cx="1367790" cy="887730"/>
             <a:chOff x="7137" y="3057"/>
             <a:chExt cx="3848" cy="1280"/>
@@ -4730,8 +4730,8 @@
         </p:nvCxnSpPr>
         <p:spPr>
           <a:xfrm>
-            <a:off x="8950960" y="2866390"/>
-            <a:ext cx="121285" cy="1318895"/>
+            <a:off x="9797415" y="2922270"/>
+            <a:ext cx="26035" cy="1231900"/>
           </a:xfrm>
           <a:prstGeom prst="straightConnector1">
             <a:avLst/>
@@ -4763,7 +4763,7 @@
         </p:nvGrpSpPr>
         <p:grpSpPr>
           <a:xfrm>
-            <a:off x="5436235" y="2933065"/>
+            <a:off x="6701155" y="3199130"/>
             <a:ext cx="1291590" cy="814070"/>
             <a:chOff x="7086" y="887"/>
             <a:chExt cx="4379" cy="1180"/>
@@ -4862,8 +4862,8 @@
         </p:nvCxnSpPr>
         <p:spPr>
           <a:xfrm>
-            <a:off x="5263515" y="1959610"/>
-            <a:ext cx="818515" cy="973455"/>
+            <a:off x="6593205" y="2097405"/>
+            <a:ext cx="753745" cy="1101725"/>
           </a:xfrm>
           <a:prstGeom prst="straightConnector1">
             <a:avLst/>
@@ -4891,15 +4891,15 @@
         <p:nvCxnSpPr>
           <p:cNvPr id="88" name="Straight Arrow Connector 87"/>
           <p:cNvCxnSpPr>
-            <a:stCxn id="17" idx="3"/>
+            <a:stCxn id="15" idx="6"/>
             <a:endCxn id="41" idx="0"/>
           </p:cNvCxnSpPr>
           <p:nvPr/>
         </p:nvCxnSpPr>
         <p:spPr>
           <a:xfrm>
-            <a:off x="6931025" y="864235"/>
-            <a:ext cx="2019935" cy="1189355"/>
+            <a:off x="6994525" y="874395"/>
+            <a:ext cx="2802890" cy="1235075"/>
           </a:xfrm>
           <a:prstGeom prst="straightConnector1">
             <a:avLst/>
@@ -5188,6 +5188,215 @@
             </p:txBody>
           </p:sp>
         </p:grpSp>
+      </p:grpSp>
+      <p:sp>
+        <p:nvSpPr>
+          <p:cNvPr id="3" name="Ellipse 2"/>
+          <p:cNvSpPr/>
+          <p:nvPr/>
+        </p:nvSpPr>
+        <p:spPr>
+          <a:xfrm>
+            <a:off x="65405" y="1560830"/>
+            <a:ext cx="1917065" cy="1367790"/>
+          </a:xfrm>
+          <a:prstGeom prst="ellipse">
+            <a:avLst/>
+          </a:prstGeom>
+        </p:spPr>
+        <p:style>
+          <a:lnRef idx="1">
+            <a:schemeClr val="accent5"/>
+          </a:lnRef>
+          <a:fillRef idx="2">
+            <a:schemeClr val="accent5"/>
+          </a:fillRef>
+          <a:effectRef idx="1">
+            <a:schemeClr val="accent5"/>
+          </a:effectRef>
+          <a:fontRef idx="minor">
+            <a:schemeClr val="dk1"/>
+          </a:fontRef>
+        </p:style>
+        <p:txBody>
+          <a:bodyPr rtlCol="0" anchor="ctr"/>
+          <a:p>
+            <a:pPr algn="ctr"/>
+            <a:r>
+              <a:rPr lang="x-none" altLang="fr-FR"/>
+              <a:t>Bouton d'arrêt d'urgence enclenché ?</a:t>
+            </a:r>
+            <a:endParaRPr lang="x-none" altLang="fr-FR"/>
+          </a:p>
+        </p:txBody>
+      </p:sp>
+      <p:cxnSp>
+        <p:nvCxnSpPr>
+          <p:cNvPr id="26" name="Straight Arrow Connector 25"/>
+          <p:cNvCxnSpPr>
+            <a:stCxn id="15" idx="2"/>
+            <a:endCxn id="3" idx="0"/>
+          </p:cNvCxnSpPr>
+          <p:nvPr/>
+        </p:nvCxnSpPr>
+        <p:spPr>
+          <a:xfrm flipH="1">
+            <a:off x="1024255" y="874395"/>
+            <a:ext cx="3526790" cy="686435"/>
+          </a:xfrm>
+          <a:prstGeom prst="straightConnector1">
+            <a:avLst/>
+          </a:prstGeom>
+          <a:ln>
+            <a:tailEnd type="arrow" w="med" len="med"/>
+          </a:ln>
+        </p:spPr>
+        <p:style>
+          <a:lnRef idx="3">
+            <a:schemeClr val="dk1"/>
+          </a:lnRef>
+          <a:fillRef idx="0">
+            <a:schemeClr val="dk1"/>
+          </a:fillRef>
+          <a:effectRef idx="2">
+            <a:schemeClr val="dk1"/>
+          </a:effectRef>
+          <a:fontRef idx="minor">
+            <a:schemeClr val="tx1"/>
+          </a:fontRef>
+        </p:style>
+      </p:cxnSp>
+      <p:cxnSp>
+        <p:nvCxnSpPr>
+          <p:cNvPr id="27" name="Straight Arrow Connector 26"/>
+          <p:cNvCxnSpPr>
+            <a:stCxn id="3" idx="4"/>
+            <a:endCxn id="32" idx="0"/>
+          </p:cNvCxnSpPr>
+          <p:nvPr/>
+        </p:nvCxnSpPr>
+        <p:spPr>
+          <a:xfrm flipH="1">
+            <a:off x="944245" y="2928620"/>
+            <a:ext cx="80010" cy="391160"/>
+          </a:xfrm>
+          <a:prstGeom prst="straightConnector1">
+            <a:avLst/>
+          </a:prstGeom>
+          <a:ln>
+            <a:tailEnd type="arrow" w="med" len="med"/>
+          </a:ln>
+        </p:spPr>
+        <p:style>
+          <a:lnRef idx="3">
+            <a:schemeClr val="dk1"/>
+          </a:lnRef>
+          <a:fillRef idx="0">
+            <a:schemeClr val="dk1"/>
+          </a:fillRef>
+          <a:effectRef idx="2">
+            <a:schemeClr val="dk1"/>
+          </a:effectRef>
+          <a:fontRef idx="minor">
+            <a:schemeClr val="tx1"/>
+          </a:fontRef>
+        </p:style>
+      </p:cxnSp>
+      <p:grpSp>
+        <p:nvGrpSpPr>
+          <p:cNvPr id="31" name="Grouper 30"/>
+          <p:cNvGrpSpPr/>
+          <p:nvPr/>
+        </p:nvGrpSpPr>
+        <p:grpSpPr>
+          <a:xfrm>
+            <a:off x="438785" y="3319780"/>
+            <a:ext cx="1010920" cy="799465"/>
+            <a:chOff x="7086" y="887"/>
+            <a:chExt cx="4379" cy="1180"/>
+          </a:xfrm>
+        </p:grpSpPr>
+        <p:sp>
+          <p:nvSpPr>
+            <p:cNvPr id="32" name="Rectangle à coins arrondi 31"/>
+            <p:cNvSpPr/>
+            <p:nvPr/>
+          </p:nvSpPr>
+          <p:spPr>
+            <a:xfrm>
+              <a:off x="7086" y="887"/>
+              <a:ext cx="4379" cy="1180"/>
+            </a:xfrm>
+            <a:prstGeom prst="roundRect">
+              <a:avLst/>
+            </a:prstGeom>
+            <a:scene3d>
+              <a:camera prst="obliqueTopRight"/>
+              <a:lightRig rig="threePt" dir="t"/>
+            </a:scene3d>
+            <a:sp3d contourW="6350">
+              <a:extrusionClr>
+                <a:schemeClr val="accent1">
+                  <a:lumMod val="50000"/>
+                </a:schemeClr>
+              </a:extrusionClr>
+              <a:contourClr>
+                <a:schemeClr val="bg1"/>
+              </a:contourClr>
+            </a:sp3d>
+          </p:spPr>
+          <p:style>
+            <a:lnRef idx="1">
+              <a:schemeClr val="accent5"/>
+            </a:lnRef>
+            <a:fillRef idx="2">
+              <a:schemeClr val="accent5"/>
+            </a:fillRef>
+            <a:effectRef idx="1">
+              <a:schemeClr val="accent5"/>
+            </a:effectRef>
+            <a:fontRef idx="minor">
+              <a:schemeClr val="dk1"/>
+            </a:fontRef>
+          </p:style>
+          <p:txBody>
+            <a:bodyPr rtlCol="0" anchor="ctr"/>
+            <a:p>
+              <a:pPr algn="ctr"/>
+              <a:endParaRPr lang="fr-FR" altLang="en-US"/>
+            </a:p>
+          </p:txBody>
+        </p:sp>
+        <p:sp>
+          <p:nvSpPr>
+            <p:cNvPr id="33" name="TextBox 32"/>
+            <p:cNvSpPr txBox="1"/>
+            <p:nvPr/>
+          </p:nvSpPr>
+          <p:spPr>
+            <a:xfrm>
+              <a:off x="7227" y="974"/>
+              <a:ext cx="4165" cy="948"/>
+            </a:xfrm>
+            <a:prstGeom prst="rect">
+              <a:avLst/>
+            </a:prstGeom>
+            <a:noFill/>
+          </p:spPr>
+          <p:txBody>
+            <a:bodyPr wrap="square" rtlCol="0">
+              <a:spAutoFit/>
+            </a:bodyPr>
+            <a:p>
+              <a:pPr algn="ctr"/>
+              <a:r>
+                <a:rPr lang="x-none" altLang="fr-FR"/>
+                <a:t>delay forever</a:t>
+              </a:r>
+              <a:endParaRPr lang="x-none" altLang="fr-FR"/>
+            </a:p>
+          </p:txBody>
+        </p:sp>
       </p:grpSp>
     </p:spTree>
   </p:cSld>

</xml_diff>

<commit_message>
Cerveau: AI - update schema + handle emergencyStopButton
</commit_message>
<xml_diff>
--- a/Module Cerveau/Artificial Intelligence/AI_functional_schema.pptx
+++ b/Module Cerveau/Artificial Intelligence/AI_functional_schema.pptx
@@ -2924,7 +2924,7 @@
         </p:nvGrpSpPr>
         <p:grpSpPr>
           <a:xfrm>
-            <a:off x="2317750" y="5819140"/>
+            <a:off x="2261235" y="5907405"/>
             <a:ext cx="1752600" cy="476250"/>
             <a:chOff x="7086" y="887"/>
             <a:chExt cx="4379" cy="1180"/>
@@ -3005,7 +3005,7 @@
               <a:pPr algn="ctr"/>
               <a:r>
                 <a:rPr lang="x-none" altLang="fr-FR"/>
-                <a:t>Bot::stop</a:t>
+                <a:t>Stop</a:t>
               </a:r>
               <a:endParaRPr lang="x-none" altLang="fr-FR"/>
             </a:p>
@@ -3020,7 +3020,7 @@
         </p:nvGrpSpPr>
         <p:grpSpPr>
           <a:xfrm>
-            <a:off x="10645775" y="2055495"/>
+            <a:off x="10645775" y="2192655"/>
             <a:ext cx="1397635" cy="2268220"/>
             <a:chOff x="7086" y="887"/>
             <a:chExt cx="4379" cy="1180"/>
@@ -3116,7 +3116,7 @@
         </p:nvGrpSpPr>
         <p:grpSpPr>
           <a:xfrm>
-            <a:off x="4551045" y="467995"/>
+            <a:off x="4665345" y="490855"/>
             <a:ext cx="2443480" cy="812800"/>
             <a:chOff x="7137" y="3057"/>
             <a:chExt cx="3848" cy="1280"/>
@@ -3183,7 +3183,7 @@
               <a:pPr algn="ctr"/>
               <a:r>
                 <a:rPr lang="x-none" altLang="fr-FR" u="sng"/>
-                <a:t>El padre AI</a:t>
+                <a:t>El padre IA</a:t>
               </a:r>
               <a:br>
                 <a:rPr lang="x-none" altLang="fr-FR"/>
@@ -3451,8 +3451,8 @@
         </p:nvGrpSpPr>
         <p:grpSpPr>
           <a:xfrm>
-            <a:off x="1450975" y="4258310"/>
-            <a:ext cx="1677670" cy="788670"/>
+            <a:off x="1653540" y="4234180"/>
+            <a:ext cx="1355090" cy="788670"/>
             <a:chOff x="7086" y="887"/>
             <a:chExt cx="4379" cy="1180"/>
           </a:xfrm>
@@ -3532,7 +3532,7 @@
               <a:pPr algn="ctr"/>
               <a:r>
                 <a:rPr lang="x-none" altLang="fr-FR"/>
-                <a:t>Lacher cynlindre</a:t>
+                <a:t>Lâcher cynlindre</a:t>
               </a:r>
               <a:endParaRPr lang="x-none" altLang="fr-FR"/>
             </a:p>
@@ -3547,7 +3547,7 @@
         </p:nvGrpSpPr>
         <p:grpSpPr>
           <a:xfrm>
-            <a:off x="9085580" y="4154170"/>
+            <a:off x="9085580" y="3984625"/>
             <a:ext cx="1475105" cy="1317625"/>
             <a:chOff x="7086" y="887"/>
             <a:chExt cx="4379" cy="1180"/>
@@ -3628,7 +3628,7 @@
               <a:pPr algn="ctr"/>
               <a:r>
                 <a:rPr lang="x-none" altLang="fr-FR"/>
-                <a:t>Bot::stop pendant un certain temps</a:t>
+                <a:t>Stop pendant un certain temps</a:t>
               </a:r>
               <a:endParaRPr lang="x-none" altLang="fr-FR"/>
             </a:p>
@@ -3643,7 +3643,7 @@
         </p:nvGrpSpPr>
         <p:grpSpPr>
           <a:xfrm>
-            <a:off x="9033510" y="2109470"/>
+            <a:off x="9033510" y="2158365"/>
             <a:ext cx="1527810" cy="812800"/>
             <a:chOff x="7137" y="3057"/>
             <a:chExt cx="3848" cy="1280"/>
@@ -3824,8 +3824,8 @@
         </p:nvCxnSpPr>
         <p:spPr>
           <a:xfrm flipH="1">
-            <a:off x="3265170" y="1162050"/>
-            <a:ext cx="1644015" cy="657860"/>
+            <a:off x="3265170" y="1184910"/>
+            <a:ext cx="1758315" cy="635000"/>
           </a:xfrm>
           <a:prstGeom prst="straightConnector1">
             <a:avLst/>
@@ -3895,9 +3895,9 @@
           <p:nvPr/>
         </p:nvCxnSpPr>
         <p:spPr>
-          <a:xfrm flipH="1">
-            <a:off x="2277110" y="4004310"/>
-            <a:ext cx="41910" cy="314325"/>
+          <a:xfrm>
+            <a:off x="2319020" y="4004310"/>
+            <a:ext cx="2540" cy="290195"/>
           </a:xfrm>
           <a:prstGeom prst="straightConnector1">
             <a:avLst/>
@@ -3932,8 +3932,8 @@
         </p:nvCxnSpPr>
         <p:spPr>
           <a:xfrm>
-            <a:off x="2289810" y="5046980"/>
-            <a:ext cx="918210" cy="807085"/>
+            <a:off x="2331085" y="5022850"/>
+            <a:ext cx="820420" cy="919480"/>
           </a:xfrm>
           <a:prstGeom prst="straightConnector1">
             <a:avLst/>
@@ -3968,8 +3968,8 @@
         </p:nvCxnSpPr>
         <p:spPr>
           <a:xfrm flipH="1">
-            <a:off x="3208020" y="2632710"/>
-            <a:ext cx="57150" cy="3221355"/>
+            <a:off x="3151505" y="2632710"/>
+            <a:ext cx="113665" cy="3309620"/>
           </a:xfrm>
           <a:prstGeom prst="straightConnector1">
             <a:avLst/>
@@ -4004,8 +4004,8 @@
         </p:nvCxnSpPr>
         <p:spPr>
           <a:xfrm>
-            <a:off x="6636385" y="1162050"/>
-            <a:ext cx="1623060" cy="946785"/>
+            <a:off x="6750685" y="1184910"/>
+            <a:ext cx="1508760" cy="923925"/>
           </a:xfrm>
           <a:prstGeom prst="straightConnector1">
             <a:avLst/>
@@ -4076,8 +4076,8 @@
         </p:nvCxnSpPr>
         <p:spPr>
           <a:xfrm>
-            <a:off x="5933440" y="3995420"/>
-            <a:ext cx="175260" cy="1430020"/>
+            <a:off x="5957570" y="3987165"/>
+            <a:ext cx="50800" cy="629920"/>
           </a:xfrm>
           <a:prstGeom prst="straightConnector1">
             <a:avLst/>
@@ -4112,8 +4112,8 @@
         </p:nvCxnSpPr>
         <p:spPr>
           <a:xfrm>
-            <a:off x="6994525" y="874395"/>
-            <a:ext cx="4350385" cy="1181100"/>
+            <a:off x="7108825" y="897255"/>
+            <a:ext cx="4236085" cy="1295400"/>
           </a:xfrm>
           <a:prstGeom prst="straightConnector1">
             <a:avLst/>
@@ -4145,8 +4145,8 @@
         </p:nvGrpSpPr>
         <p:grpSpPr>
           <a:xfrm>
-            <a:off x="3607435" y="4513580"/>
-            <a:ext cx="1659255" cy="814070"/>
+            <a:off x="3608070" y="4699635"/>
+            <a:ext cx="1353185" cy="814070"/>
             <a:chOff x="7086" y="887"/>
             <a:chExt cx="4379" cy="1180"/>
           </a:xfrm>
@@ -4308,7 +4308,7 @@
               <a:pPr algn="ctr"/>
               <a:r>
                 <a:rPr lang="x-none" altLang="fr-FR"/>
-                <a:t>Dépot de cylindre présent ?</a:t>
+                <a:t>Dépôt de cylindre présent ?</a:t>
               </a:r>
               <a:endParaRPr lang="x-none" altLang="fr-FR"/>
             </a:p>
@@ -4325,9 +4325,9 @@
           <p:nvPr/>
         </p:nvCxnSpPr>
         <p:spPr>
-          <a:xfrm>
-            <a:off x="4415790" y="4112260"/>
-            <a:ext cx="34290" cy="461645"/>
+          <a:xfrm flipH="1">
+            <a:off x="4295775" y="4112260"/>
+            <a:ext cx="120015" cy="647700"/>
           </a:xfrm>
           <a:prstGeom prst="straightConnector1">
             <a:avLst/>
@@ -4362,8 +4362,8 @@
         </p:nvCxnSpPr>
         <p:spPr>
           <a:xfrm>
-            <a:off x="5772785" y="1280795"/>
-            <a:ext cx="125095" cy="410845"/>
+            <a:off x="5887085" y="1303655"/>
+            <a:ext cx="10795" cy="387985"/>
           </a:xfrm>
           <a:prstGeom prst="straightConnector1">
             <a:avLst/>
@@ -4517,7 +4517,7 @@
         <p:spPr>
           <a:xfrm>
             <a:off x="5897880" y="2504440"/>
-            <a:ext cx="35560" cy="603250"/>
+            <a:ext cx="59690" cy="594995"/>
           </a:xfrm>
           <a:prstGeom prst="straightConnector1">
             <a:avLst/>
@@ -4549,8 +4549,8 @@
         </p:nvGrpSpPr>
         <p:grpSpPr>
           <a:xfrm>
-            <a:off x="5194300" y="5425440"/>
-            <a:ext cx="1828800" cy="1156970"/>
+            <a:off x="5162550" y="4617085"/>
+            <a:ext cx="1691005" cy="1156970"/>
             <a:chOff x="7086" y="887"/>
             <a:chExt cx="4379" cy="1180"/>
           </a:xfrm>
@@ -4630,7 +4630,7 @@
               <a:pPr algn="ctr"/>
               <a:r>
                 <a:rPr lang="x-none" altLang="fr-FR"/>
-                <a:t>Bot::stop pendant un certain temps</a:t>
+                <a:t>Stop pendant un certain temps</a:t>
               </a:r>
               <a:endParaRPr lang="x-none" altLang="fr-FR"/>
             </a:p>
@@ -4645,7 +4645,7 @@
         </p:nvGrpSpPr>
         <p:grpSpPr>
           <a:xfrm>
-            <a:off x="5249545" y="3107690"/>
+            <a:off x="5273675" y="3099435"/>
             <a:ext cx="1367790" cy="887730"/>
             <a:chOff x="7137" y="3057"/>
             <a:chExt cx="3848" cy="1280"/>
@@ -4730,8 +4730,8 @@
         </p:nvCxnSpPr>
         <p:spPr>
           <a:xfrm>
-            <a:off x="9797415" y="2922270"/>
-            <a:ext cx="26035" cy="1231900"/>
+            <a:off x="9797415" y="2971165"/>
+            <a:ext cx="26035" cy="1013460"/>
           </a:xfrm>
           <a:prstGeom prst="straightConnector1">
             <a:avLst/>
@@ -4763,7 +4763,7 @@
         </p:nvGrpSpPr>
         <p:grpSpPr>
           <a:xfrm>
-            <a:off x="6701155" y="3199130"/>
+            <a:off x="6789420" y="3199130"/>
             <a:ext cx="1291590" cy="814070"/>
             <a:chOff x="7086" y="887"/>
             <a:chExt cx="4379" cy="1180"/>
@@ -4855,15 +4855,15 @@
         <p:nvCxnSpPr>
           <p:cNvPr id="87" name="Straight Arrow Connector 86"/>
           <p:cNvCxnSpPr>
-            <a:stCxn id="68" idx="3"/>
+            <a:stCxn id="67" idx="6"/>
             <a:endCxn id="85" idx="0"/>
           </p:cNvCxnSpPr>
           <p:nvPr/>
         </p:nvCxnSpPr>
         <p:spPr>
           <a:xfrm>
-            <a:off x="6593205" y="2097405"/>
-            <a:ext cx="753745" cy="1101725"/>
+            <a:off x="6619240" y="2098040"/>
+            <a:ext cx="815975" cy="1101090"/>
           </a:xfrm>
           <a:prstGeom prst="straightConnector1">
             <a:avLst/>
@@ -4898,8 +4898,8 @@
         </p:nvCxnSpPr>
         <p:spPr>
           <a:xfrm>
-            <a:off x="6994525" y="874395"/>
-            <a:ext cx="2802890" cy="1235075"/>
+            <a:off x="7108825" y="897255"/>
+            <a:ext cx="2688590" cy="1261110"/>
           </a:xfrm>
           <a:prstGeom prst="straightConnector1">
             <a:avLst/>
@@ -4931,8 +4931,8 @@
         </p:nvSpPr>
         <p:spPr>
           <a:xfrm>
-            <a:off x="905510" y="-13335"/>
-            <a:ext cx="10548620" cy="520065"/>
+            <a:off x="731520" y="-12700"/>
+            <a:ext cx="10723245" cy="520065"/>
           </a:xfrm>
           <a:prstGeom prst="rightArrow">
             <a:avLst>
@@ -5241,8 +5241,8 @@
         </p:nvCxnSpPr>
         <p:spPr>
           <a:xfrm flipH="1">
-            <a:off x="1024255" y="874395"/>
-            <a:ext cx="3526790" cy="686435"/>
+            <a:off x="1024255" y="897255"/>
+            <a:ext cx="3641090" cy="663575"/>
           </a:xfrm>
           <a:prstGeom prst="straightConnector1">
             <a:avLst/>
@@ -5277,8 +5277,8 @@
         </p:nvCxnSpPr>
         <p:spPr>
           <a:xfrm flipH="1">
-            <a:off x="944245" y="2928620"/>
-            <a:ext cx="80010" cy="391160"/>
+            <a:off x="833120" y="2928620"/>
+            <a:ext cx="191135" cy="641985"/>
           </a:xfrm>
           <a:prstGeom prst="straightConnector1">
             <a:avLst/>
@@ -5310,8 +5310,8 @@
         </p:nvGrpSpPr>
         <p:grpSpPr>
           <a:xfrm>
-            <a:off x="438785" y="3319780"/>
-            <a:ext cx="1010920" cy="799465"/>
+            <a:off x="255270" y="3570605"/>
+            <a:ext cx="1155065" cy="1322705"/>
             <a:chOff x="7086" y="887"/>
             <a:chExt cx="4379" cy="1180"/>
           </a:xfrm>
@@ -5376,7 +5376,7 @@
           <p:spPr>
             <a:xfrm>
               <a:off x="7227" y="974"/>
-              <a:ext cx="4165" cy="948"/>
+              <a:ext cx="4165" cy="817"/>
             </a:xfrm>
             <a:prstGeom prst="rect">
               <a:avLst/>
@@ -5387,6 +5387,14 @@
             <a:bodyPr wrap="square" rtlCol="0">
               <a:spAutoFit/>
             </a:bodyPr>
+            <a:p>
+              <a:pPr algn="ctr"/>
+              <a:r>
+                <a:rPr lang="x-none" altLang="fr-FR"/>
+                <a:t>stopAll +</a:t>
+              </a:r>
+              <a:endParaRPr lang="x-none" altLang="fr-FR"/>
+            </a:p>
             <a:p>
               <a:pPr algn="ctr"/>
               <a:r>

</xml_diff>